<commit_message>
Added last slide links in the notes
</commit_message>
<xml_diff>
--- a/proteomics workflow.pptx
+++ b/proteomics workflow.pptx
@@ -234,7 +234,7 @@
           <a:p>
             <a:fld id="{41067FC4-3587-43AC-9566-1A8A204FCA57}" type="datetimeFigureOut">
               <a:rPr lang="en-US" smtClean="0"/>
-              <a:t>4/28/2020</a:t>
+              <a:t>5/8/21</a:t>
             </a:fld>
             <a:endParaRPr lang="en-US"/>
           </a:p>
@@ -573,79 +573,11 @@
                   <a:srgbClr val="FF0000"/>
                 </a:solidFill>
               </a:rPr>
-              <a:t>Step </a:t>
-            </a:r>
-            <a:r>
-              <a:rPr lang="en-US" sz="800" baseline="0" dirty="0" smtClean="0">
-                <a:solidFill>
-                  <a:srgbClr val="FF0000"/>
-                </a:solidFill>
-              </a:rPr>
-              <a:t>1 also </a:t>
-            </a:r>
-            <a:r>
-              <a:rPr lang="en-US" sz="800" baseline="0" dirty="0">
-                <a:solidFill>
-                  <a:srgbClr val="FF0000"/>
-                </a:solidFill>
-              </a:rPr>
-              <a:t>involves picking samples for analysis</a:t>
+              <a:t>Step 1 also involves picking samples for analysis</a:t>
             </a:r>
             <a:r>
               <a:rPr lang="en-US" sz="800" baseline="0" dirty="0"/>
-              <a:t>. Step </a:t>
-            </a:r>
-            <a:r>
-              <a:rPr lang="en-US" sz="800" baseline="0" dirty="0" smtClean="0"/>
-              <a:t>2 </a:t>
-            </a:r>
-            <a:r>
-              <a:rPr lang="en-US" sz="800" baseline="0" dirty="0"/>
-              <a:t>involves physically disrupting the sample, to lyse cells or increase the surface area of tissues, so that Step </a:t>
-            </a:r>
-            <a:r>
-              <a:rPr lang="en-US" sz="800" baseline="0" dirty="0" smtClean="0"/>
-              <a:t>3, </a:t>
-            </a:r>
-            <a:r>
-              <a:rPr lang="en-US" sz="800" baseline="0" dirty="0"/>
-              <a:t>denaturation and solubilization, and occur more efficiently. The denaturation step disrupts secondary structures of proteins allowing them to unfold, which makes them more accessible to the digestion enzymes used in Step </a:t>
-            </a:r>
-            <a:r>
-              <a:rPr lang="en-US" sz="800" baseline="0" dirty="0" smtClean="0"/>
-              <a:t>4. </a:t>
-            </a:r>
-            <a:r>
-              <a:rPr lang="en-US" sz="800" baseline="0" dirty="0"/>
-              <a:t>The digestion enzymes, typically trypsin but others as well, cut the proteins into smaller pieces called peptides. In some experiments, enrichments are performed to look at certain post-translational modifications (PTM, Step </a:t>
-            </a:r>
-            <a:r>
-              <a:rPr lang="en-US" sz="800" baseline="0" dirty="0" smtClean="0"/>
-              <a:t>5). </a:t>
-            </a:r>
-            <a:r>
-              <a:rPr lang="en-US" sz="800" baseline="0" dirty="0"/>
-              <a:t>If quantitative results are desired, the peptides can be mass tagged in a multi-plex experiment (Step </a:t>
-            </a:r>
-            <a:r>
-              <a:rPr lang="en-US" sz="800" baseline="0" dirty="0" smtClean="0"/>
-              <a:t>6). </a:t>
-            </a:r>
-            <a:r>
-              <a:rPr lang="en-US" sz="800" baseline="0" dirty="0"/>
-              <a:t>Regardless of PTM enrichments or mass tagging, the final step in the sample prep is to inject and detect the peptides by LC-MS/MS (Step </a:t>
-            </a:r>
-            <a:r>
-              <a:rPr lang="en-US" sz="800" baseline="0" dirty="0" smtClean="0"/>
-              <a:t>7) </a:t>
-            </a:r>
-            <a:r>
-              <a:rPr lang="en-US" sz="800" baseline="0" dirty="0"/>
-              <a:t>then analyze the data (Step </a:t>
-            </a:r>
-            <a:r>
-              <a:rPr lang="en-US" sz="800" baseline="0" dirty="0" smtClean="0"/>
-              <a:t>8).</a:t>
+              <a:t>. Step 2 involves physically disrupting the sample, to lyse cells or increase the surface area of tissues, so that Step 3, denaturation and solubilization, and occur more efficiently. The denaturation step disrupts secondary structures of proteins allowing them to unfold, which makes them more accessible to the digestion enzymes used in Step 4. The digestion enzymes, typically trypsin but others as well, cut the proteins into smaller pieces called peptides. In some experiments, enrichments are performed to look at certain post-translational modifications (PTM, Step 5). If quantitative results are desired, the peptides can be mass tagged in a multi-plex experiment (Step 6). Regardless of PTM enrichments or mass tagging, the final step in the sample prep is to inject and detect the peptides by LC-MS/MS (Step 7) then analyze the data (Step 8).</a:t>
             </a:r>
             <a:endParaRPr lang="en-US" sz="800" dirty="0"/>
           </a:p>
@@ -733,23 +665,7 @@
           <a:p>
             <a:r>
               <a:rPr lang="en-US" dirty="0"/>
-              <a:t>In the peptide shown in the slide, there are two possible phosphorylation </a:t>
-            </a:r>
-            <a:r>
-              <a:rPr lang="en-US" dirty="0" smtClean="0"/>
-              <a:t>sites (</a:t>
-            </a:r>
-            <a:r>
-              <a:rPr lang="en-US" dirty="0" err="1" smtClean="0"/>
-              <a:t>serines</a:t>
-            </a:r>
-            <a:r>
-              <a:rPr lang="en-US" dirty="0" smtClean="0"/>
-              <a:t>, shown in red). </a:t>
-            </a:r>
-            <a:r>
-              <a:rPr lang="en-US" dirty="0"/>
-              <a:t>If the peptide has a mass shift of 80 Da, one of the </a:t>
+              <a:t>In the peptide shown in the slide, there are two possible phosphorylation sites (</a:t>
             </a:r>
             <a:r>
               <a:rPr lang="en-US" dirty="0" err="1"/>
@@ -757,6 +673,14 @@
             </a:r>
             <a:r>
               <a:rPr lang="en-US" dirty="0"/>
+              <a:t>, shown in red). If the peptide has a mass shift of 80 Da, one of the </a:t>
+            </a:r>
+            <a:r>
+              <a:rPr lang="en-US" dirty="0" err="1"/>
+              <a:t>serines</a:t>
+            </a:r>
+            <a:r>
+              <a:rPr lang="en-US" dirty="0"/>
               <a:t> is phosphorylated. In this case,</a:t>
             </a:r>
             <a:r>
@@ -777,18 +701,14 @@
             </a:r>
             <a:r>
               <a:rPr lang="en-US" baseline="0" dirty="0"/>
-              <a:t> being phosphorylated with the detection of the b14 and y8 ions</a:t>
-            </a:r>
-            <a:r>
-              <a:rPr lang="en-US" baseline="0" dirty="0" smtClean="0"/>
-              <a:t>. The underlined </a:t>
-            </a:r>
-            <a:r>
-              <a:rPr lang="en-US" baseline="0" dirty="0" err="1" smtClean="0"/>
+              <a:t> being phosphorylated with the detection of the b14 and y8 ions. The underlined </a:t>
+            </a:r>
+            <a:r>
+              <a:rPr lang="en-US" baseline="0" dirty="0" err="1"/>
               <a:t>serines</a:t>
             </a:r>
             <a:r>
-              <a:rPr lang="en-US" baseline="0" dirty="0" smtClean="0"/>
+              <a:rPr lang="en-US" baseline="0" dirty="0"/>
               <a:t> indicates it is phosphorylated.</a:t>
             </a:r>
             <a:endParaRPr lang="en-US" dirty="0"/>
@@ -1081,24 +1001,58 @@
             </a:r>
             <a:r>
               <a:rPr lang="en-US" baseline="0" dirty="0"/>
-              <a:t> refer to the more detailed slide set on TMT labeling for quantitative experiments</a:t>
-            </a:r>
-            <a:r>
-              <a:rPr lang="en-US" baseline="0" dirty="0" smtClean="0"/>
-              <a:t>.</a:t>
-            </a:r>
-          </a:p>
-          <a:p>
-            <a:r>
-              <a:rPr lang="en-US" baseline="0" dirty="0" smtClean="0"/>
-              <a:t>Please refer to the more detailed slide set on LC-MS/MS analysis.</a:t>
+              <a:t> refer to the more detailed slide set on TMT labeling for quantitative experiments: https://</a:t>
+            </a:r>
+            <a:r>
+              <a:rPr lang="en-US" baseline="0" dirty="0" err="1"/>
+              <a:t>github.com</a:t>
+            </a:r>
+            <a:r>
+              <a:rPr lang="en-US" baseline="0"/>
+              <a:t>/OHSU-Proteomics/TMT_overview_2020</a:t>
             </a:r>
             <a:endParaRPr lang="en-US" baseline="0" dirty="0"/>
           </a:p>
           <a:p>
+            <a:endParaRPr lang="en-US" baseline="0" dirty="0"/>
+          </a:p>
+          <a:p>
             <a:r>
               <a:rPr lang="en-US" baseline="0" dirty="0"/>
-              <a:t>Please refer to the more detailed slide set on Data Analysis.</a:t>
+              <a:t>Please refer to the more detailed slide set on LC-MS/MS analysis: https://</a:t>
+            </a:r>
+            <a:r>
+              <a:rPr lang="en-US" baseline="0" dirty="0" err="1"/>
+              <a:t>github.com</a:t>
+            </a:r>
+            <a:r>
+              <a:rPr lang="en-US" baseline="0" dirty="0"/>
+              <a:t>/OHSU-Proteomics/LC-MSMS</a:t>
+            </a:r>
+          </a:p>
+          <a:p>
+            <a:endParaRPr lang="en-US" baseline="0" dirty="0"/>
+          </a:p>
+          <a:p>
+            <a:r>
+              <a:rPr lang="en-US" baseline="0" dirty="0"/>
+              <a:t>Please refer to the more detailed slide set on Data Analysis: https://</a:t>
+            </a:r>
+            <a:r>
+              <a:rPr lang="en-US" baseline="0" dirty="0" err="1"/>
+              <a:t>ohsu-proteomics.github.io</a:t>
+            </a:r>
+            <a:r>
+              <a:rPr lang="en-US" baseline="0" dirty="0"/>
+              <a:t>/</a:t>
+            </a:r>
+            <a:r>
+              <a:rPr lang="en-US" baseline="0" dirty="0" err="1"/>
+              <a:t>Data_Analysis_Overview</a:t>
+            </a:r>
+            <a:r>
+              <a:rPr lang="en-US" baseline="0" dirty="0"/>
+              <a:t>/</a:t>
             </a:r>
             <a:endParaRPr lang="en-US" dirty="0"/>
           </a:p>
@@ -1468,16 +1422,12 @@
               <a:t>If we are working with smaller amounts of protein, for example &lt; 1 mg, then we might use </a:t>
             </a:r>
             <a:r>
-              <a:rPr lang="en-US" dirty="0" err="1" smtClean="0"/>
+              <a:rPr lang="en-US" dirty="0" err="1"/>
               <a:t>ProteaseMAX</a:t>
             </a:r>
             <a:r>
-              <a:rPr lang="en-US" baseline="0" dirty="0" smtClean="0"/>
-              <a:t> </a:t>
-            </a:r>
-            <a:r>
               <a:rPr lang="en-US" baseline="0" dirty="0"/>
-              <a:t>or do an </a:t>
+              <a:t> or do an </a:t>
             </a:r>
             <a:r>
               <a:rPr lang="en-US" baseline="0" dirty="0" err="1"/>
@@ -2168,7 +2118,7 @@
           <a:p>
             <a:fld id="{10B14725-1624-4485-BEF7-22BA18BB1CF2}" type="datetimeFigureOut">
               <a:rPr lang="en-US" smtClean="0"/>
-              <a:t>4/28/2020</a:t>
+              <a:t>5/8/21</a:t>
             </a:fld>
             <a:endParaRPr lang="en-US"/>
           </a:p>
@@ -2336,7 +2286,7 @@
           <a:p>
             <a:fld id="{10B14725-1624-4485-BEF7-22BA18BB1CF2}" type="datetimeFigureOut">
               <a:rPr lang="en-US" smtClean="0"/>
-              <a:t>4/28/2020</a:t>
+              <a:t>5/8/21</a:t>
             </a:fld>
             <a:endParaRPr lang="en-US"/>
           </a:p>
@@ -2514,7 +2464,7 @@
           <a:p>
             <a:fld id="{10B14725-1624-4485-BEF7-22BA18BB1CF2}" type="datetimeFigureOut">
               <a:rPr lang="en-US" smtClean="0"/>
-              <a:t>4/28/2020</a:t>
+              <a:t>5/8/21</a:t>
             </a:fld>
             <a:endParaRPr lang="en-US"/>
           </a:p>
@@ -2704,7 +2654,7 @@
           <a:p>
             <a:fld id="{4FF8354C-3ADE-4FF4-94C3-28F07CCF52FC}" type="datetimeFigureOut">
               <a:rPr lang="en-US" smtClean="0"/>
-              <a:t>4/28/2020</a:t>
+              <a:t>5/8/21</a:t>
             </a:fld>
             <a:endParaRPr lang="en-US"/>
           </a:p>
@@ -2872,7 +2822,7 @@
           <a:p>
             <a:fld id="{4FF8354C-3ADE-4FF4-94C3-28F07CCF52FC}" type="datetimeFigureOut">
               <a:rPr lang="en-US" smtClean="0"/>
-              <a:t>4/28/2020</a:t>
+              <a:t>5/8/21</a:t>
             </a:fld>
             <a:endParaRPr lang="en-US"/>
           </a:p>
@@ -3117,7 +3067,7 @@
           <a:p>
             <a:fld id="{4FF8354C-3ADE-4FF4-94C3-28F07CCF52FC}" type="datetimeFigureOut">
               <a:rPr lang="en-US" smtClean="0"/>
-              <a:t>4/28/2020</a:t>
+              <a:t>5/8/21</a:t>
             </a:fld>
             <a:endParaRPr lang="en-US"/>
           </a:p>
@@ -3346,7 +3296,7 @@
           <a:p>
             <a:fld id="{4FF8354C-3ADE-4FF4-94C3-28F07CCF52FC}" type="datetimeFigureOut">
               <a:rPr lang="en-US" smtClean="0"/>
-              <a:t>4/28/2020</a:t>
+              <a:t>5/8/21</a:t>
             </a:fld>
             <a:endParaRPr lang="en-US"/>
           </a:p>
@@ -3710,7 +3660,7 @@
           <a:p>
             <a:fld id="{4FF8354C-3ADE-4FF4-94C3-28F07CCF52FC}" type="datetimeFigureOut">
               <a:rPr lang="en-US" smtClean="0"/>
-              <a:t>4/28/2020</a:t>
+              <a:t>5/8/21</a:t>
             </a:fld>
             <a:endParaRPr lang="en-US"/>
           </a:p>
@@ -3827,7 +3777,7 @@
           <a:p>
             <a:fld id="{4FF8354C-3ADE-4FF4-94C3-28F07CCF52FC}" type="datetimeFigureOut">
               <a:rPr lang="en-US" smtClean="0"/>
-              <a:t>4/28/2020</a:t>
+              <a:t>5/8/21</a:t>
             </a:fld>
             <a:endParaRPr lang="en-US"/>
           </a:p>
@@ -3922,7 +3872,7 @@
           <a:p>
             <a:fld id="{4FF8354C-3ADE-4FF4-94C3-28F07CCF52FC}" type="datetimeFigureOut">
               <a:rPr lang="en-US" smtClean="0"/>
-              <a:t>4/28/2020</a:t>
+              <a:t>5/8/21</a:t>
             </a:fld>
             <a:endParaRPr lang="en-US"/>
           </a:p>
@@ -4197,7 +4147,7 @@
           <a:p>
             <a:fld id="{4FF8354C-3ADE-4FF4-94C3-28F07CCF52FC}" type="datetimeFigureOut">
               <a:rPr lang="en-US" smtClean="0"/>
-              <a:t>4/28/2020</a:t>
+              <a:t>5/8/21</a:t>
             </a:fld>
             <a:endParaRPr lang="en-US"/>
           </a:p>
@@ -4365,7 +4315,7 @@
           <a:p>
             <a:fld id="{10B14725-1624-4485-BEF7-22BA18BB1CF2}" type="datetimeFigureOut">
               <a:rPr lang="en-US" smtClean="0"/>
-              <a:t>4/28/2020</a:t>
+              <a:t>5/8/21</a:t>
             </a:fld>
             <a:endParaRPr lang="en-US"/>
           </a:p>
@@ -4617,7 +4567,7 @@
           <a:p>
             <a:fld id="{4FF8354C-3ADE-4FF4-94C3-28F07CCF52FC}" type="datetimeFigureOut">
               <a:rPr lang="en-US" smtClean="0"/>
-              <a:t>4/28/2020</a:t>
+              <a:t>5/8/21</a:t>
             </a:fld>
             <a:endParaRPr lang="en-US"/>
           </a:p>
@@ -4785,7 +4735,7 @@
           <a:p>
             <a:fld id="{4FF8354C-3ADE-4FF4-94C3-28F07CCF52FC}" type="datetimeFigureOut">
               <a:rPr lang="en-US" smtClean="0"/>
-              <a:t>4/28/2020</a:t>
+              <a:t>5/8/21</a:t>
             </a:fld>
             <a:endParaRPr lang="en-US"/>
           </a:p>
@@ -4963,7 +4913,7 @@
           <a:p>
             <a:fld id="{4FF8354C-3ADE-4FF4-94C3-28F07CCF52FC}" type="datetimeFigureOut">
               <a:rPr lang="en-US" smtClean="0"/>
-              <a:t>4/28/2020</a:t>
+              <a:t>5/8/21</a:t>
             </a:fld>
             <a:endParaRPr lang="en-US"/>
           </a:p>
@@ -5208,7 +5158,7 @@
           <a:p>
             <a:fld id="{10B14725-1624-4485-BEF7-22BA18BB1CF2}" type="datetimeFigureOut">
               <a:rPr lang="en-US" smtClean="0"/>
-              <a:t>4/28/2020</a:t>
+              <a:t>5/8/21</a:t>
             </a:fld>
             <a:endParaRPr lang="en-US"/>
           </a:p>
@@ -5493,7 +5443,7 @@
           <a:p>
             <a:fld id="{10B14725-1624-4485-BEF7-22BA18BB1CF2}" type="datetimeFigureOut">
               <a:rPr lang="en-US" smtClean="0"/>
-              <a:t>4/28/2020</a:t>
+              <a:t>5/8/21</a:t>
             </a:fld>
             <a:endParaRPr lang="en-US"/>
           </a:p>
@@ -5912,7 +5862,7 @@
           <a:p>
             <a:fld id="{10B14725-1624-4485-BEF7-22BA18BB1CF2}" type="datetimeFigureOut">
               <a:rPr lang="en-US" smtClean="0"/>
-              <a:t>4/28/2020</a:t>
+              <a:t>5/8/21</a:t>
             </a:fld>
             <a:endParaRPr lang="en-US"/>
           </a:p>
@@ -6029,7 +5979,7 @@
           <a:p>
             <a:fld id="{10B14725-1624-4485-BEF7-22BA18BB1CF2}" type="datetimeFigureOut">
               <a:rPr lang="en-US" smtClean="0"/>
-              <a:t>4/28/2020</a:t>
+              <a:t>5/8/21</a:t>
             </a:fld>
             <a:endParaRPr lang="en-US"/>
           </a:p>
@@ -6124,7 +6074,7 @@
           <a:p>
             <a:fld id="{10B14725-1624-4485-BEF7-22BA18BB1CF2}" type="datetimeFigureOut">
               <a:rPr lang="en-US" smtClean="0"/>
-              <a:t>4/28/2020</a:t>
+              <a:t>5/8/21</a:t>
             </a:fld>
             <a:endParaRPr lang="en-US"/>
           </a:p>
@@ -6399,7 +6349,7 @@
           <a:p>
             <a:fld id="{10B14725-1624-4485-BEF7-22BA18BB1CF2}" type="datetimeFigureOut">
               <a:rPr lang="en-US" smtClean="0"/>
-              <a:t>4/28/2020</a:t>
+              <a:t>5/8/21</a:t>
             </a:fld>
             <a:endParaRPr lang="en-US"/>
           </a:p>
@@ -6651,7 +6601,7 @@
           <a:p>
             <a:fld id="{10B14725-1624-4485-BEF7-22BA18BB1CF2}" type="datetimeFigureOut">
               <a:rPr lang="en-US" smtClean="0"/>
-              <a:t>4/28/2020</a:t>
+              <a:t>5/8/21</a:t>
             </a:fld>
             <a:endParaRPr lang="en-US"/>
           </a:p>
@@ -6862,7 +6812,7 @@
           <a:p>
             <a:fld id="{10B14725-1624-4485-BEF7-22BA18BB1CF2}" type="datetimeFigureOut">
               <a:rPr lang="en-US" smtClean="0"/>
-              <a:t>4/28/2020</a:t>
+              <a:t>5/8/21</a:t>
             </a:fld>
             <a:endParaRPr lang="en-US"/>
           </a:p>
@@ -7370,7 +7320,7 @@
           <a:p>
             <a:fld id="{4FF8354C-3ADE-4FF4-94C3-28F07CCF52FC}" type="datetimeFigureOut">
               <a:rPr lang="en-US" smtClean="0"/>
-              <a:t>4/28/2020</a:t>
+              <a:t>5/8/21</a:t>
             </a:fld>
             <a:endParaRPr lang="en-US"/>
           </a:p>
@@ -7895,13 +7845,8 @@
             <a:p>
               <a:r>
                 <a:rPr lang="en-US" dirty="0"/>
-                <a:t>   </a:t>
+                <a:t>   experiment</a:t>
               </a:r>
-              <a:r>
-                <a:rPr lang="en-US" dirty="0" smtClean="0"/>
-                <a:t>experiment</a:t>
-              </a:r>
-              <a:endParaRPr lang="en-US" dirty="0"/>
             </a:p>
           </p:txBody>
         </p:sp>
@@ -7953,15 +7898,7 @@
           <a:p>
             <a:r>
               <a:rPr lang="en-US" dirty="0"/>
-              <a:t>3</a:t>
-            </a:r>
-            <a:r>
-              <a:rPr lang="en-US" dirty="0" smtClean="0"/>
-              <a:t>. </a:t>
-            </a:r>
-            <a:r>
-              <a:rPr lang="en-US" dirty="0"/>
-              <a:t>Denaturing/solubilizing</a:t>
+              <a:t>3. Denaturing/solubilizing</a:t>
             </a:r>
           </a:p>
         </p:txBody>
@@ -8028,15 +7965,7 @@
           <a:p>
             <a:r>
               <a:rPr lang="en-US" dirty="0"/>
-              <a:t>4</a:t>
-            </a:r>
-            <a:r>
-              <a:rPr lang="en-US" dirty="0" smtClean="0"/>
-              <a:t>. </a:t>
-            </a:r>
-            <a:r>
-              <a:rPr lang="en-US" dirty="0"/>
-              <a:t>Digestion</a:t>
+              <a:t>4. Digestion</a:t>
             </a:r>
           </a:p>
         </p:txBody>
@@ -8330,15 +8259,7 @@
               <a:pPr algn="ctr"/>
               <a:r>
                 <a:rPr lang="en-US" dirty="0"/>
-                <a:t>5</a:t>
-              </a:r>
-              <a:r>
-                <a:rPr lang="en-US" dirty="0" smtClean="0"/>
-                <a:t>. </a:t>
-              </a:r>
-              <a:r>
-                <a:rPr lang="en-US" dirty="0"/>
-                <a:t>Enrichment</a:t>
+                <a:t>5. Enrichment</a:t>
               </a:r>
             </a:p>
             <a:p>
@@ -8450,15 +8371,7 @@
               <a:pPr algn="ctr"/>
               <a:r>
                 <a:rPr lang="en-US" dirty="0"/>
-                <a:t>6</a:t>
-              </a:r>
-              <a:r>
-                <a:rPr lang="en-US" dirty="0" smtClean="0"/>
-                <a:t>. </a:t>
-              </a:r>
-              <a:r>
-                <a:rPr lang="en-US" dirty="0"/>
-                <a:t>Mass tagging</a:t>
+                <a:t>6. Mass tagging</a:t>
               </a:r>
             </a:p>
             <a:p>
@@ -8569,15 +8482,7 @@
             <a:p>
               <a:r>
                 <a:rPr lang="en-US" dirty="0"/>
-                <a:t>7</a:t>
-              </a:r>
-              <a:r>
-                <a:rPr lang="en-US" dirty="0" smtClean="0"/>
-                <a:t>. </a:t>
-              </a:r>
-              <a:r>
-                <a:rPr lang="en-US" dirty="0"/>
-                <a:t>LC-MS/MS</a:t>
+                <a:t>7. LC-MS/MS</a:t>
               </a:r>
             </a:p>
           </p:txBody>
@@ -8657,15 +8562,7 @@
             <a:p>
               <a:r>
                 <a:rPr lang="en-US" dirty="0"/>
-                <a:t>8</a:t>
-              </a:r>
-              <a:r>
-                <a:rPr lang="en-US" dirty="0" smtClean="0"/>
-                <a:t>. </a:t>
-              </a:r>
-              <a:r>
-                <a:rPr lang="en-US" dirty="0"/>
-                <a:t>Data Analysis</a:t>
+                <a:t>8. Data Analysis</a:t>
               </a:r>
             </a:p>
           </p:txBody>
@@ -8957,15 +8854,7 @@
           <a:p>
             <a:r>
               <a:rPr lang="en-US" dirty="0"/>
-              <a:t>2</a:t>
-            </a:r>
-            <a:r>
-              <a:rPr lang="en-US" dirty="0" smtClean="0"/>
-              <a:t>. </a:t>
-            </a:r>
-            <a:r>
-              <a:rPr lang="en-US" dirty="0"/>
-              <a:t>Sample disruption</a:t>
+              <a:t>2. Sample disruption</a:t>
             </a:r>
           </a:p>
         </p:txBody>
@@ -9083,13 +8972,8 @@
           <a:p>
             <a:r>
               <a:rPr lang="en-US" dirty="0"/>
-              <a:t>p</a:t>
-            </a:r>
-            <a:r>
-              <a:rPr lang="en-US" dirty="0" smtClean="0"/>
-              <a:t>ick the samples</a:t>
-            </a:r>
-            <a:endParaRPr lang="en-US" dirty="0"/>
+              <a:t>pick the samples</a:t>
+            </a:r>
           </a:p>
         </p:txBody>
       </p:sp>
@@ -9116,10 +9000,9 @@
           <a:lstStyle/>
           <a:p>
             <a:r>
-              <a:rPr lang="en-US" dirty="0" smtClean="0"/>
+              <a:rPr lang="en-US" dirty="0"/>
               <a:t>&amp;</a:t>
             </a:r>
-            <a:endParaRPr lang="en-US" dirty="0"/>
           </a:p>
         </p:txBody>
       </p:sp>
@@ -10341,27 +10224,18 @@
           <a:p>
             <a:r>
               <a:rPr lang="en-US" sz="4400" dirty="0"/>
-              <a:t>Step 6: Quantitation with TMT </a:t>
-            </a:r>
-            <a:r>
-              <a:rPr lang="en-US" sz="4400" dirty="0" smtClean="0"/>
-              <a:t>Labeling</a:t>
-            </a:r>
-            <a:br>
-              <a:rPr lang="en-US" sz="4400" dirty="0" smtClean="0"/>
-            </a:br>
-            <a:r>
-              <a:rPr lang="en-US" sz="4400" dirty="0"/>
-              <a:t/>
+              <a:t>Step 6: Quantitation with TMT Labeling</a:t>
             </a:r>
             <a:br>
               <a:rPr lang="en-US" sz="4400" dirty="0"/>
             </a:br>
-            <a:r>
-              <a:rPr lang="en-US" sz="4400" dirty="0" smtClean="0"/>
+            <a:br>
+              <a:rPr lang="en-US" sz="4400" dirty="0"/>
+            </a:br>
+            <a:r>
+              <a:rPr lang="en-US" sz="4400" dirty="0"/>
               <a:t>Step 7: LC-MS/MS analysis</a:t>
             </a:r>
-            <a:endParaRPr lang="en-US" sz="4400" dirty="0"/>
           </a:p>
         </p:txBody>
       </p:sp>
@@ -10408,15 +10282,7 @@
           <a:p>
             <a:r>
               <a:rPr lang="en-US" sz="4400" dirty="0"/>
-              <a:t>Step </a:t>
-            </a:r>
-            <a:r>
-              <a:rPr lang="en-US" sz="4400" dirty="0" smtClean="0"/>
-              <a:t>8: </a:t>
-            </a:r>
-            <a:r>
-              <a:rPr lang="en-US" sz="4400" dirty="0"/>
-              <a:t>Data Analysis</a:t>
+              <a:t>Step 8: Data Analysis</a:t>
             </a:r>
           </a:p>
         </p:txBody>
@@ -11803,11 +11669,7 @@
             <a:pPr lvl="1"/>
             <a:r>
               <a:rPr lang="en-US" dirty="0"/>
-              <a:t>Can be used for solution or gel </a:t>
-            </a:r>
-            <a:r>
-              <a:rPr lang="en-US" dirty="0" smtClean="0"/>
-              <a:t>samples</a:t>
+              <a:t>Can be used for solution or gel samples</a:t>
             </a:r>
           </a:p>
           <a:p>
@@ -11970,18 +11832,17 @@
           <a:lstStyle/>
           <a:p>
             <a:r>
-              <a:rPr lang="en-US" dirty="0" smtClean="0"/>
+              <a:rPr lang="en-US" dirty="0"/>
               <a:t>S-trap (</a:t>
             </a:r>
             <a:r>
-              <a:rPr lang="en-US" dirty="0" err="1" smtClean="0"/>
+              <a:rPr lang="en-US" dirty="0" err="1"/>
               <a:t>ProtiFi</a:t>
             </a:r>
             <a:r>
-              <a:rPr lang="en-US" dirty="0" smtClean="0"/>
+              <a:rPr lang="en-US" dirty="0"/>
               <a:t>)</a:t>
             </a:r>
-            <a:endParaRPr lang="en-US" dirty="0"/>
           </a:p>
           <a:p>
             <a:pPr lvl="1"/>

</xml_diff>